<commit_message>
cambio de de debut sexual y nombres de ejes en español
</commit_message>
<xml_diff>
--- a/SEROFOI/summary_models/BRA-017-01_HPV16.pptx
+++ b/SEROFOI/summary_models/BRA-017-01_HPV16.pptx
@@ -197,7 +197,7 @@
           <a:p>
             <a:fld id="{BC75BA5E-2995-40FE-B4EF-03B4BA91F8EF}" type="datetimeFigureOut">
               <a:rPr lang="es-CO" smtClean="0"/>
-              <a:t>17/06/2024</a:t>
+              <a:t>18/06/2024</a:t>
             </a:fld>
             <a:endParaRPr lang="es-CO"/>
           </a:p>
@@ -701,7 +701,7 @@
           <a:p>
             <a:fld id="{C4B358D2-CB39-423C-B469-643C11D9A1D6}" type="datetimeFigureOut">
               <a:rPr lang="es-CO" smtClean="0"/>
-              <a:t>17/06/2024</a:t>
+              <a:t>18/06/2024</a:t>
             </a:fld>
             <a:endParaRPr lang="es-CO"/>
           </a:p>
@@ -901,7 +901,7 @@
           <a:p>
             <a:fld id="{C4B358D2-CB39-423C-B469-643C11D9A1D6}" type="datetimeFigureOut">
               <a:rPr lang="es-CO" smtClean="0"/>
-              <a:t>17/06/2024</a:t>
+              <a:t>18/06/2024</a:t>
             </a:fld>
             <a:endParaRPr lang="es-CO"/>
           </a:p>
@@ -1111,7 +1111,7 @@
           <a:p>
             <a:fld id="{C4B358D2-CB39-423C-B469-643C11D9A1D6}" type="datetimeFigureOut">
               <a:rPr lang="es-CO" smtClean="0"/>
-              <a:t>17/06/2024</a:t>
+              <a:t>18/06/2024</a:t>
             </a:fld>
             <a:endParaRPr lang="es-CO"/>
           </a:p>
@@ -1311,7 +1311,7 @@
           <a:p>
             <a:fld id="{C4B358D2-CB39-423C-B469-643C11D9A1D6}" type="datetimeFigureOut">
               <a:rPr lang="es-CO" smtClean="0"/>
-              <a:t>17/06/2024</a:t>
+              <a:t>18/06/2024</a:t>
             </a:fld>
             <a:endParaRPr lang="es-CO"/>
           </a:p>
@@ -1587,7 +1587,7 @@
           <a:p>
             <a:fld id="{C4B358D2-CB39-423C-B469-643C11D9A1D6}" type="datetimeFigureOut">
               <a:rPr lang="es-CO" smtClean="0"/>
-              <a:t>17/06/2024</a:t>
+              <a:t>18/06/2024</a:t>
             </a:fld>
             <a:endParaRPr lang="es-CO"/>
           </a:p>
@@ -1855,7 +1855,7 @@
           <a:p>
             <a:fld id="{C4B358D2-CB39-423C-B469-643C11D9A1D6}" type="datetimeFigureOut">
               <a:rPr lang="es-CO" smtClean="0"/>
-              <a:t>17/06/2024</a:t>
+              <a:t>18/06/2024</a:t>
             </a:fld>
             <a:endParaRPr lang="es-CO"/>
           </a:p>
@@ -2270,7 +2270,7 @@
           <a:p>
             <a:fld id="{C4B358D2-CB39-423C-B469-643C11D9A1D6}" type="datetimeFigureOut">
               <a:rPr lang="es-CO" smtClean="0"/>
-              <a:t>17/06/2024</a:t>
+              <a:t>18/06/2024</a:t>
             </a:fld>
             <a:endParaRPr lang="es-CO"/>
           </a:p>
@@ -2412,7 +2412,7 @@
           <a:p>
             <a:fld id="{C4B358D2-CB39-423C-B469-643C11D9A1D6}" type="datetimeFigureOut">
               <a:rPr lang="es-CO" smtClean="0"/>
-              <a:t>17/06/2024</a:t>
+              <a:t>18/06/2024</a:t>
             </a:fld>
             <a:endParaRPr lang="es-CO"/>
           </a:p>
@@ -2525,7 +2525,7 @@
           <a:p>
             <a:fld id="{C4B358D2-CB39-423C-B469-643C11D9A1D6}" type="datetimeFigureOut">
               <a:rPr lang="es-CO" smtClean="0"/>
-              <a:t>17/06/2024</a:t>
+              <a:t>18/06/2024</a:t>
             </a:fld>
             <a:endParaRPr lang="es-CO"/>
           </a:p>
@@ -2838,7 +2838,7 @@
           <a:p>
             <a:fld id="{C4B358D2-CB39-423C-B469-643C11D9A1D6}" type="datetimeFigureOut">
               <a:rPr lang="es-CO" smtClean="0"/>
-              <a:t>17/06/2024</a:t>
+              <a:t>18/06/2024</a:t>
             </a:fld>
             <a:endParaRPr lang="es-CO"/>
           </a:p>
@@ -3127,7 +3127,7 @@
           <a:p>
             <a:fld id="{C4B358D2-CB39-423C-B469-643C11D9A1D6}" type="datetimeFigureOut">
               <a:rPr lang="es-CO" smtClean="0"/>
-              <a:t>17/06/2024</a:t>
+              <a:t>18/06/2024</a:t>
             </a:fld>
             <a:endParaRPr lang="es-CO"/>
           </a:p>
@@ -3370,7 +3370,7 @@
           <a:p>
             <a:fld id="{C4B358D2-CB39-423C-B469-643C11D9A1D6}" type="datetimeFigureOut">
               <a:rPr lang="es-CO" smtClean="0"/>
-              <a:t>17/06/2024</a:t>
+              <a:t>18/06/2024</a:t>
             </a:fld>
             <a:endParaRPr lang="es-CO"/>
           </a:p>
@@ -3789,10 +3789,10 @@
       </p:grpSpPr>
       <p:graphicFrame>
         <p:nvGraphicFramePr>
-          <p:cNvPr id="6" name="Tabla 5">
+          <p:cNvPr id="25" name="Tabla 24">
             <a:extLst>
               <a:ext uri="{FF2B5EF4-FFF2-40B4-BE49-F238E27FC236}">
-                <a16:creationId xmlns:a16="http://schemas.microsoft.com/office/drawing/2014/main" id="{B8FEF9A3-34BF-58E0-853A-7D04759E4F7A}"/>
+                <a16:creationId xmlns:a16="http://schemas.microsoft.com/office/drawing/2014/main" id="{2F990C7A-FED7-15F4-3FFC-78747918CF79}"/>
               </a:ext>
             </a:extLst>
           </p:cNvPr>
@@ -3802,73 +3802,73 @@
           <p:nvPr/>
         </p:nvGraphicFramePr>
         <p:xfrm>
-          <a:off x="1720850" y="3544094"/>
-          <a:ext cx="8750300" cy="914400"/>
+          <a:off x="1193800" y="2930684"/>
+          <a:ext cx="9804400" cy="2141220"/>
         </p:xfrm>
         <a:graphic>
           <a:graphicData uri="http://schemas.openxmlformats.org/drawingml/2006/table">
             <a:tbl>
               <a:tblPr/>
               <a:tblGrid>
-                <a:gridCol w="1701800">
+                <a:gridCol w="1562100">
                   <a:extLst>
                     <a:ext uri="{9D8B030D-6E8A-4147-A177-3AD203B41FA5}">
-                      <a16:colId xmlns:a16="http://schemas.microsoft.com/office/drawing/2014/main" val="4240183240"/>
+                      <a16:colId xmlns:a16="http://schemas.microsoft.com/office/drawing/2014/main" val="1870969837"/>
                     </a:ext>
                   </a:extLst>
                 </a:gridCol>
-                <a:gridCol w="965200">
+                <a:gridCol w="1054100">
                   <a:extLst>
                     <a:ext uri="{9D8B030D-6E8A-4147-A177-3AD203B41FA5}">
-                      <a16:colId xmlns:a16="http://schemas.microsoft.com/office/drawing/2014/main" val="2338770068"/>
+                      <a16:colId xmlns:a16="http://schemas.microsoft.com/office/drawing/2014/main" val="2800521"/>
                     </a:ext>
                   </a:extLst>
                 </a:gridCol>
-                <a:gridCol w="1790700">
+                <a:gridCol w="2387600">
                   <a:extLst>
                     <a:ext uri="{9D8B030D-6E8A-4147-A177-3AD203B41FA5}">
-                      <a16:colId xmlns:a16="http://schemas.microsoft.com/office/drawing/2014/main" val="244801267"/>
+                      <a16:colId xmlns:a16="http://schemas.microsoft.com/office/drawing/2014/main" val="876938442"/>
                     </a:ext>
                   </a:extLst>
                 </a:gridCol>
                 <a:gridCol w="787400">
                   <a:extLst>
                     <a:ext uri="{9D8B030D-6E8A-4147-A177-3AD203B41FA5}">
-                      <a16:colId xmlns:a16="http://schemas.microsoft.com/office/drawing/2014/main" val="3374884507"/>
+                      <a16:colId xmlns:a16="http://schemas.microsoft.com/office/drawing/2014/main" val="2926772238"/>
                     </a:ext>
                   </a:extLst>
                 </a:gridCol>
-                <a:gridCol w="787400">
+                <a:gridCol w="990600">
                   <a:extLst>
                     <a:ext uri="{9D8B030D-6E8A-4147-A177-3AD203B41FA5}">
-                      <a16:colId xmlns:a16="http://schemas.microsoft.com/office/drawing/2014/main" val="1663995922"/>
+                      <a16:colId xmlns:a16="http://schemas.microsoft.com/office/drawing/2014/main" val="2485903207"/>
                     </a:ext>
                   </a:extLst>
                 </a:gridCol>
-                <a:gridCol w="1270000">
+                <a:gridCol w="2019300">
                   <a:extLst>
                     <a:ext uri="{9D8B030D-6E8A-4147-A177-3AD203B41FA5}">
-                      <a16:colId xmlns:a16="http://schemas.microsoft.com/office/drawing/2014/main" val="54655470"/>
+                      <a16:colId xmlns:a16="http://schemas.microsoft.com/office/drawing/2014/main" val="348892264"/>
                     </a:ext>
                   </a:extLst>
                 </a:gridCol>
-                <a:gridCol w="1447800">
+                <a:gridCol w="1003300">
                   <a:extLst>
                     <a:ext uri="{9D8B030D-6E8A-4147-A177-3AD203B41FA5}">
-                      <a16:colId xmlns:a16="http://schemas.microsoft.com/office/drawing/2014/main" val="469094673"/>
+                      <a16:colId xmlns:a16="http://schemas.microsoft.com/office/drawing/2014/main" val="108193723"/>
                     </a:ext>
                   </a:extLst>
                 </a:gridCol>
               </a:tblGrid>
-              <a:tr h="182880">
+              <a:tr h="579120">
                 <a:tc>
                   <a:txBody>
                     <a:bodyPr/>
                     <a:lstStyle/>
                     <a:p>
-                      <a:pPr algn="l" fontAlgn="b"/>
+                      <a:pPr algn="ctr" fontAlgn="ctr"/>
                       <a:r>
-                        <a:rPr lang="es-CO" sz="1100" b="0" i="0" u="none" strike="noStrike">
+                        <a:rPr lang="es-CO" sz="1200" b="0" i="0" u="none" strike="noStrike">
                           <a:solidFill>
                             <a:srgbClr val="000000"/>
                           </a:solidFill>
@@ -3876,14 +3876,14 @@
                           <a:highlight>
                             <a:srgbClr val="DCE6F1"/>
                           </a:highlight>
-                          <a:latin typeface="Calibri" panose="020F0502020204030204" pitchFamily="34" charset="0"/>
+                          <a:latin typeface="Arial" panose="020B0604020202020204" pitchFamily="34" charset="0"/>
                         </a:rPr>
                         <a:t>Nombre del modelo</a:t>
                       </a:r>
                     </a:p>
                   </a:txBody>
-                  <a:tcPr marL="7620" marR="7620" marT="7620" marB="0" anchor="b">
-                    <a:lnL w="6350" cap="flat" cmpd="sng" algn="ctr">
+                  <a:tcPr marL="7620" marR="7620" marT="7620" marB="0" anchor="ctr">
+                    <a:lnL w="12700" cap="flat" cmpd="sng" algn="ctr">
                       <a:solidFill>
                         <a:srgbClr val="000000"/>
                       </a:solidFill>
@@ -3901,7 +3901,7 @@
                       <a:headEnd type="none" w="med" len="med"/>
                       <a:tailEnd type="none" w="med" len="med"/>
                     </a:lnR>
-                    <a:lnT w="6350" cap="flat" cmpd="sng" algn="ctr">
+                    <a:lnT w="12700" cap="flat" cmpd="sng" algn="ctr">
                       <a:solidFill>
                         <a:srgbClr val="000000"/>
                       </a:solidFill>
@@ -3910,7 +3910,7 @@
                       <a:headEnd type="none" w="med" len="med"/>
                       <a:tailEnd type="none" w="med" len="med"/>
                     </a:lnT>
-                    <a:lnB w="6350" cap="flat" cmpd="sng" algn="ctr">
+                    <a:lnB w="12700" cap="flat" cmpd="sng" algn="ctr">
                       <a:solidFill>
                         <a:srgbClr val="000000"/>
                       </a:solidFill>
@@ -3929,9 +3929,9 @@
                     <a:bodyPr/>
                     <a:lstStyle/>
                     <a:p>
-                      <a:pPr algn="l" fontAlgn="b"/>
+                      <a:pPr algn="ctr" fontAlgn="ctr"/>
                       <a:r>
-                        <a:rPr lang="es-CO" sz="1100" b="0" i="0" u="none" strike="noStrike">
+                        <a:rPr lang="es-CO" sz="1200" b="0" i="0" u="none" strike="noStrike">
                           <a:solidFill>
                             <a:srgbClr val="000000"/>
                           </a:solidFill>
@@ -3939,13 +3939,13 @@
                           <a:highlight>
                             <a:srgbClr val="DCE6F1"/>
                           </a:highlight>
-                          <a:latin typeface="Calibri" panose="020F0502020204030204" pitchFamily="34" charset="0"/>
+                          <a:latin typeface="Arial" panose="020B0604020202020204" pitchFamily="34" charset="0"/>
                         </a:rPr>
                         <a:t>elpd_loo</a:t>
                       </a:r>
                     </a:p>
                   </a:txBody>
-                  <a:tcPr marL="7620" marR="7620" marT="7620" marB="0" anchor="b">
+                  <a:tcPr marL="7620" marR="7620" marT="7620" marB="0" anchor="ctr">
                     <a:lnL w="6350" cap="flat" cmpd="sng" algn="ctr">
                       <a:solidFill>
                         <a:srgbClr val="000000"/>
@@ -3964,7 +3964,7 @@
                       <a:headEnd type="none" w="med" len="med"/>
                       <a:tailEnd type="none" w="med" len="med"/>
                     </a:lnR>
-                    <a:lnT w="6350" cap="flat" cmpd="sng" algn="ctr">
+                    <a:lnT w="12700" cap="flat" cmpd="sng" algn="ctr">
                       <a:solidFill>
                         <a:srgbClr val="000000"/>
                       </a:solidFill>
@@ -3973,7 +3973,7 @@
                       <a:headEnd type="none" w="med" len="med"/>
                       <a:tailEnd type="none" w="med" len="med"/>
                     </a:lnT>
-                    <a:lnB w="6350" cap="flat" cmpd="sng" algn="ctr">
+                    <a:lnB w="12700" cap="flat" cmpd="sng" algn="ctr">
                       <a:solidFill>
                         <a:srgbClr val="000000"/>
                       </a:solidFill>
@@ -3992,9 +3992,9 @@
                     <a:bodyPr/>
                     <a:lstStyle/>
                     <a:p>
-                      <a:pPr algn="l" fontAlgn="b"/>
+                      <a:pPr algn="ctr" fontAlgn="ctr"/>
                       <a:r>
-                        <a:rPr lang="es-CO" sz="1100" b="0" i="0" u="none" strike="noStrike">
+                        <a:rPr lang="es-CO" sz="1200" b="0" i="0" u="none" strike="noStrike">
                           <a:solidFill>
                             <a:srgbClr val="000000"/>
                           </a:solidFill>
@@ -4002,13 +4002,13 @@
                           <a:highlight>
                             <a:srgbClr val="DCE6F1"/>
                           </a:highlight>
-                          <a:latin typeface="Calibri" panose="020F0502020204030204" pitchFamily="34" charset="0"/>
+                          <a:latin typeface="Arial" panose="020B0604020202020204" pitchFamily="34" charset="0"/>
                         </a:rPr>
-                        <a:t>foi</a:t>
+                        <a:t>Fuerza de infección</a:t>
                       </a:r>
                     </a:p>
                   </a:txBody>
-                  <a:tcPr marL="7620" marR="7620" marT="7620" marB="0" anchor="b">
+                  <a:tcPr marL="7620" marR="7620" marT="7620" marB="0" anchor="ctr">
                     <a:lnL w="6350" cap="flat" cmpd="sng" algn="ctr">
                       <a:solidFill>
                         <a:srgbClr val="000000"/>
@@ -4027,7 +4027,7 @@
                       <a:headEnd type="none" w="med" len="med"/>
                       <a:tailEnd type="none" w="med" len="med"/>
                     </a:lnR>
-                    <a:lnT w="6350" cap="flat" cmpd="sng" algn="ctr">
+                    <a:lnT w="12700" cap="flat" cmpd="sng" algn="ctr">
                       <a:solidFill>
                         <a:srgbClr val="000000"/>
                       </a:solidFill>
@@ -4036,7 +4036,7 @@
                       <a:headEnd type="none" w="med" len="med"/>
                       <a:tailEnd type="none" w="med" len="med"/>
                     </a:lnT>
-                    <a:lnB w="6350" cap="flat" cmpd="sng" algn="ctr">
+                    <a:lnB w="12700" cap="flat" cmpd="sng" algn="ctr">
                       <a:solidFill>
                         <a:srgbClr val="000000"/>
                       </a:solidFill>
@@ -4055,9 +4055,9 @@
                     <a:bodyPr/>
                     <a:lstStyle/>
                     <a:p>
-                      <a:pPr algn="l" fontAlgn="b"/>
+                      <a:pPr algn="l" fontAlgn="ctr"/>
                       <a:r>
-                        <a:rPr lang="es-CO" sz="1100" b="0" i="0" u="none" strike="noStrike">
+                        <a:rPr lang="es-CO" sz="1200" b="0" i="0" u="none" strike="noStrike">
                           <a:solidFill>
                             <a:srgbClr val="000000"/>
                           </a:solidFill>
@@ -4065,13 +4065,13 @@
                           <a:highlight>
                             <a:srgbClr val="DCE6F1"/>
                           </a:highlight>
-                          <a:latin typeface="Calibri" panose="020F0502020204030204" pitchFamily="34" charset="0"/>
+                          <a:latin typeface="Arial" panose="020B0604020202020204" pitchFamily="34" charset="0"/>
                         </a:rPr>
-                        <a:t>foi_rhat</a:t>
+                        <a:t>FOI_Rhat</a:t>
                       </a:r>
                     </a:p>
                   </a:txBody>
-                  <a:tcPr marL="7620" marR="7620" marT="7620" marB="0" anchor="b">
+                  <a:tcPr marL="7620" marR="7620" marT="7620" marB="0" anchor="ctr">
                     <a:lnL w="6350" cap="flat" cmpd="sng" algn="ctr">
                       <a:solidFill>
                         <a:srgbClr val="000000"/>
@@ -4090,7 +4090,7 @@
                       <a:headEnd type="none" w="med" len="med"/>
                       <a:tailEnd type="none" w="med" len="med"/>
                     </a:lnR>
-                    <a:lnT w="6350" cap="flat" cmpd="sng" algn="ctr">
+                    <a:lnT w="12700" cap="flat" cmpd="sng" algn="ctr">
                       <a:solidFill>
                         <a:srgbClr val="000000"/>
                       </a:solidFill>
@@ -4099,7 +4099,7 @@
                       <a:headEnd type="none" w="med" len="med"/>
                       <a:tailEnd type="none" w="med" len="med"/>
                     </a:lnT>
-                    <a:lnB w="6350" cap="flat" cmpd="sng" algn="ctr">
+                    <a:lnB w="12700" cap="flat" cmpd="sng" algn="ctr">
                       <a:solidFill>
                         <a:srgbClr val="000000"/>
                       </a:solidFill>
@@ -4118,9 +4118,9 @@
                     <a:bodyPr/>
                     <a:lstStyle/>
                     <a:p>
-                      <a:pPr algn="l" fontAlgn="b"/>
+                      <a:pPr algn="l" fontAlgn="ctr"/>
                       <a:r>
-                        <a:rPr lang="es-CO" sz="1100" b="0" i="0" u="none" strike="noStrike">
+                        <a:rPr lang="es-CO" sz="1200" b="0" i="0" u="none" strike="noStrike">
                           <a:solidFill>
                             <a:srgbClr val="000000"/>
                           </a:solidFill>
@@ -4128,13 +4128,13 @@
                           <a:highlight>
                             <a:srgbClr val="DCE6F1"/>
                           </a:highlight>
-                          <a:latin typeface="Calibri" panose="020F0502020204030204" pitchFamily="34" charset="0"/>
+                          <a:latin typeface="Arial" panose="020B0604020202020204" pitchFamily="34" charset="0"/>
                         </a:rPr>
-                        <a:t>converged</a:t>
+                        <a:t>Convergencia</a:t>
                       </a:r>
                     </a:p>
                   </a:txBody>
-                  <a:tcPr marL="7620" marR="7620" marT="7620" marB="0" anchor="b">
+                  <a:tcPr marL="7620" marR="7620" marT="7620" marB="0" anchor="ctr">
                     <a:lnL w="6350" cap="flat" cmpd="sng" algn="ctr">
                       <a:solidFill>
                         <a:srgbClr val="000000"/>
@@ -4153,7 +4153,7 @@
                       <a:headEnd type="none" w="med" len="med"/>
                       <a:tailEnd type="none" w="med" len="med"/>
                     </a:lnR>
-                    <a:lnT w="6350" cap="flat" cmpd="sng" algn="ctr">
+                    <a:lnT w="12700" cap="flat" cmpd="sng" algn="ctr">
                       <a:solidFill>
                         <a:srgbClr val="000000"/>
                       </a:solidFill>
@@ -4162,7 +4162,7 @@
                       <a:headEnd type="none" w="med" len="med"/>
                       <a:tailEnd type="none" w="med" len="med"/>
                     </a:lnT>
-                    <a:lnB w="6350" cap="flat" cmpd="sng" algn="ctr">
+                    <a:lnB w="12700" cap="flat" cmpd="sng" algn="ctr">
                       <a:solidFill>
                         <a:srgbClr val="000000"/>
                       </a:solidFill>
@@ -4181,9 +4181,9 @@
                     <a:bodyPr/>
                     <a:lstStyle/>
                     <a:p>
-                      <a:pPr algn="l" fontAlgn="b"/>
+                      <a:pPr algn="ctr" fontAlgn="ctr"/>
                       <a:r>
-                        <a:rPr lang="es-CO" sz="1100" b="0" i="0" u="none" strike="noStrike">
+                        <a:rPr lang="es-CO" sz="1200" b="0" i="0" u="none" strike="noStrike">
                           <a:solidFill>
                             <a:srgbClr val="000000"/>
                           </a:solidFill>
@@ -4191,13 +4191,13 @@
                           <a:highlight>
                             <a:srgbClr val="DCE6F1"/>
                           </a:highlight>
-                          <a:latin typeface="Calibri" panose="020F0502020204030204" pitchFamily="34" charset="0"/>
+                          <a:latin typeface="Arial" panose="020B0604020202020204" pitchFamily="34" charset="0"/>
                         </a:rPr>
-                        <a:t>seroreversion_rate</a:t>
+                        <a:t>Tasa de seroreversión</a:t>
                       </a:r>
                     </a:p>
                   </a:txBody>
-                  <a:tcPr marL="7620" marR="7620" marT="7620" marB="0" anchor="b">
+                  <a:tcPr marL="7620" marR="7620" marT="7620" marB="0" anchor="ctr">
                     <a:lnL w="6350" cap="flat" cmpd="sng" algn="ctr">
                       <a:solidFill>
                         <a:srgbClr val="000000"/>
@@ -4216,7 +4216,7 @@
                       <a:headEnd type="none" w="med" len="med"/>
                       <a:tailEnd type="none" w="med" len="med"/>
                     </a:lnR>
-                    <a:lnT w="6350" cap="flat" cmpd="sng" algn="ctr">
+                    <a:lnT w="12700" cap="flat" cmpd="sng" algn="ctr">
                       <a:solidFill>
                         <a:srgbClr val="000000"/>
                       </a:solidFill>
@@ -4225,7 +4225,7 @@
                       <a:headEnd type="none" w="med" len="med"/>
                       <a:tailEnd type="none" w="med" len="med"/>
                     </a:lnT>
-                    <a:lnB w="6350" cap="flat" cmpd="sng" algn="ctr">
+                    <a:lnB w="12700" cap="flat" cmpd="sng" algn="ctr">
                       <a:solidFill>
                         <a:srgbClr val="000000"/>
                       </a:solidFill>
@@ -4244,9 +4244,9 @@
                     <a:bodyPr/>
                     <a:lstStyle/>
                     <a:p>
-                      <a:pPr algn="l" fontAlgn="b"/>
+                      <a:pPr algn="l" fontAlgn="ctr"/>
                       <a:r>
-                        <a:rPr lang="es-CO" sz="1100" b="0" i="0" u="none" strike="noStrike">
+                        <a:rPr lang="es-CO" sz="1200" b="0" i="0" u="none" strike="noStrike">
                           <a:solidFill>
                             <a:srgbClr val="000000"/>
                           </a:solidFill>
@@ -4254,13 +4254,13 @@
                           <a:highlight>
                             <a:srgbClr val="DCE6F1"/>
                           </a:highlight>
-                          <a:latin typeface="Calibri" panose="020F0502020204030204" pitchFamily="34" charset="0"/>
+                          <a:latin typeface="Arial" panose="020B0604020202020204" pitchFamily="34" charset="0"/>
                         </a:rPr>
-                        <a:t>seroreversion_rate_rhat</a:t>
+                        <a:t>Tasa de seroreversión Rhat</a:t>
                       </a:r>
                     </a:p>
                   </a:txBody>
-                  <a:tcPr marL="7620" marR="7620" marT="7620" marB="0" anchor="b">
+                  <a:tcPr marL="7620" marR="7620" marT="7620" marB="0" anchor="ctr">
                     <a:lnL w="6350" cap="flat" cmpd="sng" algn="ctr">
                       <a:solidFill>
                         <a:srgbClr val="000000"/>
@@ -4270,7 +4270,7 @@
                       <a:headEnd type="none" w="med" len="med"/>
                       <a:tailEnd type="none" w="med" len="med"/>
                     </a:lnL>
-                    <a:lnR w="6350" cap="flat" cmpd="sng" algn="ctr">
+                    <a:lnR w="12700" cap="flat" cmpd="sng" algn="ctr">
                       <a:solidFill>
                         <a:srgbClr val="000000"/>
                       </a:solidFill>
@@ -4279,7 +4279,7 @@
                       <a:headEnd type="none" w="med" len="med"/>
                       <a:tailEnd type="none" w="med" len="med"/>
                     </a:lnR>
-                    <a:lnT w="6350" cap="flat" cmpd="sng" algn="ctr">
+                    <a:lnT w="12700" cap="flat" cmpd="sng" algn="ctr">
                       <a:solidFill>
                         <a:srgbClr val="000000"/>
                       </a:solidFill>
@@ -4288,7 +4288,7 @@
                       <a:headEnd type="none" w="med" len="med"/>
                       <a:tailEnd type="none" w="med" len="med"/>
                     </a:lnT>
-                    <a:lnB w="6350" cap="flat" cmpd="sng" algn="ctr">
+                    <a:lnB w="12700" cap="flat" cmpd="sng" algn="ctr">
                       <a:solidFill>
                         <a:srgbClr val="000000"/>
                       </a:solidFill>
@@ -4304,11 +4304,11 @@
                 </a:tc>
                 <a:extLst>
                   <a:ext uri="{0D108BD9-81ED-4DB2-BD59-A6C34878D82A}">
-                    <a16:rowId xmlns:a16="http://schemas.microsoft.com/office/drawing/2014/main" val="1647064723"/>
+                    <a16:rowId xmlns:a16="http://schemas.microsoft.com/office/drawing/2014/main" val="2204018907"/>
                   </a:ext>
                 </a:extLst>
               </a:tr>
-              <a:tr h="182880">
+              <a:tr h="388620">
                 <a:tc>
                   <a:txBody>
                     <a:bodyPr/>
@@ -4316,19 +4316,19 @@
                     <a:p>
                       <a:pPr algn="l" fontAlgn="b"/>
                       <a:r>
-                        <a:rPr lang="es-CO" sz="1100" b="0" i="0" u="none" strike="noStrike">
+                        <a:rPr lang="es-CO" sz="1200" b="0" i="0" u="none" strike="noStrike">
                           <a:solidFill>
                             <a:srgbClr val="000000"/>
                           </a:solidFill>
                           <a:effectLst/>
-                          <a:latin typeface="Calibri" panose="020F0502020204030204" pitchFamily="34" charset="0"/>
+                          <a:latin typeface="Arial" panose="020B0604020202020204" pitchFamily="34" charset="0"/>
                         </a:rPr>
-                        <a:t>Constante sin seroreversion</a:t>
+                        <a:t>M1-Constante sin seroreversion</a:t>
                       </a:r>
                     </a:p>
                   </a:txBody>
                   <a:tcPr marL="7620" marR="7620" marT="7620" marB="0" anchor="b">
-                    <a:lnL w="6350" cap="flat" cmpd="sng" algn="ctr">
+                    <a:lnL w="12700" cap="flat" cmpd="sng" algn="ctr">
                       <a:solidFill>
                         <a:srgbClr val="000000"/>
                       </a:solidFill>
@@ -4346,7 +4346,7 @@
                       <a:headEnd type="none" w="med" len="med"/>
                       <a:tailEnd type="none" w="med" len="med"/>
                     </a:lnR>
-                    <a:lnT w="6350" cap="flat" cmpd="sng" algn="ctr">
+                    <a:lnT w="12700" cap="flat" cmpd="sng" algn="ctr">
                       <a:solidFill>
                         <a:srgbClr val="000000"/>
                       </a:solidFill>
@@ -4374,14 +4374,14 @@
                     <a:p>
                       <a:pPr algn="l" fontAlgn="b"/>
                       <a:r>
-                        <a:rPr lang="es-CO" sz="1100" b="0" i="0" u="none" strike="noStrike">
+                        <a:rPr lang="es-CO" sz="1200" b="0" i="0" u="none" strike="noStrike">
                           <a:solidFill>
                             <a:srgbClr val="000000"/>
                           </a:solidFill>
                           <a:effectLst/>
-                          <a:latin typeface="Calibri" panose="020F0502020204030204" pitchFamily="34" charset="0"/>
+                          <a:latin typeface="Arial" panose="020B0604020202020204" pitchFamily="34" charset="0"/>
                         </a:rPr>
-                        <a:t>-53.4(se=7.9)</a:t>
+                        <a:t>-5.3(se=1)</a:t>
                       </a:r>
                     </a:p>
                   </a:txBody>
@@ -4404,7 +4404,7 @@
                       <a:headEnd type="none" w="med" len="med"/>
                       <a:tailEnd type="none" w="med" len="med"/>
                     </a:lnR>
-                    <a:lnT w="6350" cap="flat" cmpd="sng" algn="ctr">
+                    <a:lnT w="12700" cap="flat" cmpd="sng" algn="ctr">
                       <a:solidFill>
                         <a:srgbClr val="000000"/>
                       </a:solidFill>
@@ -4432,14 +4432,14 @@
                     <a:p>
                       <a:pPr algn="l" fontAlgn="b"/>
                       <a:r>
-                        <a:rPr lang="es-CO" sz="1100" b="0" i="0" u="none" strike="noStrike">
+                        <a:rPr lang="es-CO" sz="1200" b="0" i="0" u="none" strike="noStrike">
                           <a:solidFill>
                             <a:srgbClr val="000000"/>
                           </a:solidFill>
                           <a:effectLst/>
-                          <a:latin typeface="Calibri" panose="020F0502020204030204" pitchFamily="34" charset="0"/>
+                          <a:latin typeface="Arial" panose="020B0604020202020204" pitchFamily="34" charset="0"/>
                         </a:rPr>
-                        <a:t>0.0049(95% CI, 0.0042-0.0055)</a:t>
+                        <a:t>0.0011(95% CI, 0.00069-0.0017)</a:t>
                       </a:r>
                     </a:p>
                   </a:txBody>
@@ -4462,7 +4462,7 @@
                       <a:headEnd type="none" w="med" len="med"/>
                       <a:tailEnd type="none" w="med" len="med"/>
                     </a:lnR>
-                    <a:lnT w="6350" cap="flat" cmpd="sng" algn="ctr">
+                    <a:lnT w="12700" cap="flat" cmpd="sng" algn="ctr">
                       <a:solidFill>
                         <a:srgbClr val="000000"/>
                       </a:solidFill>
@@ -4488,14 +4488,14 @@
                     <a:bodyPr/>
                     <a:lstStyle/>
                     <a:p>
-                      <a:pPr algn="r" fontAlgn="b"/>
+                      <a:pPr algn="ctr" fontAlgn="b"/>
                       <a:r>
-                        <a:rPr lang="es-CO" sz="1100" b="0" i="0" u="none" strike="noStrike">
+                        <a:rPr lang="es-CO" sz="1200" b="0" i="0" u="none" strike="noStrike">
                           <a:solidFill>
                             <a:srgbClr val="000000"/>
                           </a:solidFill>
                           <a:effectLst/>
-                          <a:latin typeface="Calibri" panose="020F0502020204030204" pitchFamily="34" charset="0"/>
+                          <a:latin typeface="Arial" panose="020B0604020202020204" pitchFamily="34" charset="0"/>
                         </a:rPr>
                         <a:t>1</a:t>
                       </a:r>
@@ -4520,7 +4520,65 @@
                       <a:headEnd type="none" w="med" len="med"/>
                       <a:tailEnd type="none" w="med" len="med"/>
                     </a:lnR>
-                    <a:lnT w="6350" cap="flat" cmpd="sng" algn="ctr">
+                    <a:lnT w="12700" cap="flat" cmpd="sng" algn="ctr">
+                      <a:solidFill>
+                        <a:srgbClr val="000000"/>
+                      </a:solidFill>
+                      <a:prstDash val="solid"/>
+                      <a:round/>
+                      <a:headEnd type="none" w="med" len="med"/>
+                      <a:tailEnd type="none" w="med" len="med"/>
+                    </a:lnT>
+                    <a:lnB w="6350" cap="flat" cmpd="sng" algn="ctr">
+                      <a:solidFill>
+                        <a:srgbClr val="000000"/>
+                      </a:solidFill>
+                      <a:prstDash val="solid"/>
+                      <a:round/>
+                      <a:headEnd type="none" w="med" len="med"/>
+                      <a:tailEnd type="none" w="med" len="med"/>
+                    </a:lnB>
+                    <a:noFill/>
+                  </a:tcPr>
+                </a:tc>
+                <a:tc>
+                  <a:txBody>
+                    <a:bodyPr/>
+                    <a:lstStyle/>
+                    <a:p>
+                      <a:pPr algn="ctr" fontAlgn="b"/>
+                      <a:r>
+                        <a:rPr lang="es-CO" sz="1200" b="0" i="0" u="none" strike="noStrike">
+                          <a:solidFill>
+                            <a:srgbClr val="000000"/>
+                          </a:solidFill>
+                          <a:effectLst/>
+                          <a:latin typeface="Arial" panose="020B0604020202020204" pitchFamily="34" charset="0"/>
+                        </a:rPr>
+                        <a:t>si</a:t>
+                      </a:r>
+                    </a:p>
+                  </a:txBody>
+                  <a:tcPr marL="7620" marR="7620" marT="7620" marB="0" anchor="b">
+                    <a:lnL w="6350" cap="flat" cmpd="sng" algn="ctr">
+                      <a:solidFill>
+                        <a:srgbClr val="000000"/>
+                      </a:solidFill>
+                      <a:prstDash val="solid"/>
+                      <a:round/>
+                      <a:headEnd type="none" w="med" len="med"/>
+                      <a:tailEnd type="none" w="med" len="med"/>
+                    </a:lnL>
+                    <a:lnR w="6350" cap="flat" cmpd="sng" algn="ctr">
+                      <a:solidFill>
+                        <a:srgbClr val="000000"/>
+                      </a:solidFill>
+                      <a:prstDash val="solid"/>
+                      <a:round/>
+                      <a:headEnd type="none" w="med" len="med"/>
+                      <a:tailEnd type="none" w="med" len="med"/>
+                    </a:lnR>
+                    <a:lnT w="12700" cap="flat" cmpd="sng" algn="ctr">
                       <a:solidFill>
                         <a:srgbClr val="000000"/>
                       </a:solidFill>
@@ -4548,14 +4606,14 @@
                     <a:p>
                       <a:pPr algn="l" fontAlgn="b"/>
                       <a:r>
-                        <a:rPr lang="es-CO" sz="1100" b="0" i="0" u="none" strike="noStrike">
+                        <a:rPr lang="es-CO" sz="1200" b="0" i="0" u="none" strike="noStrike">
                           <a:solidFill>
                             <a:srgbClr val="000000"/>
                           </a:solidFill>
                           <a:effectLst/>
-                          <a:latin typeface="Calibri" panose="020F0502020204030204" pitchFamily="34" charset="0"/>
+                          <a:latin typeface="Arial" panose="020B0604020202020204" pitchFamily="34" charset="0"/>
                         </a:rPr>
-                        <a:t>yes</a:t>
+                        <a:t> </a:t>
                       </a:r>
                     </a:p>
                   </a:txBody>
@@ -4578,7 +4636,7 @@
                       <a:headEnd type="none" w="med" len="med"/>
                       <a:tailEnd type="none" w="med" len="med"/>
                     </a:lnR>
-                    <a:lnT w="6350" cap="flat" cmpd="sng" algn="ctr">
+                    <a:lnT w="12700" cap="flat" cmpd="sng" algn="ctr">
                       <a:solidFill>
                         <a:srgbClr val="000000"/>
                       </a:solidFill>
@@ -4606,12 +4664,12 @@
                     <a:p>
                       <a:pPr algn="l" fontAlgn="b"/>
                       <a:r>
-                        <a:rPr lang="es-CO" sz="1100" b="0" i="0" u="none" strike="noStrike">
+                        <a:rPr lang="es-CO" sz="1200" b="0" i="0" u="none" strike="noStrike">
                           <a:solidFill>
                             <a:srgbClr val="000000"/>
                           </a:solidFill>
                           <a:effectLst/>
-                          <a:latin typeface="Calibri" panose="020F0502020204030204" pitchFamily="34" charset="0"/>
+                          <a:latin typeface="Arial" panose="020B0604020202020204" pitchFamily="34" charset="0"/>
                         </a:rPr>
                         <a:t> </a:t>
                       </a:r>
@@ -4619,6 +4677,71 @@
                   </a:txBody>
                   <a:tcPr marL="7620" marR="7620" marT="7620" marB="0" anchor="b">
                     <a:lnL w="6350" cap="flat" cmpd="sng" algn="ctr">
+                      <a:solidFill>
+                        <a:srgbClr val="000000"/>
+                      </a:solidFill>
+                      <a:prstDash val="solid"/>
+                      <a:round/>
+                      <a:headEnd type="none" w="med" len="med"/>
+                      <a:tailEnd type="none" w="med" len="med"/>
+                    </a:lnL>
+                    <a:lnR w="12700" cap="flat" cmpd="sng" algn="ctr">
+                      <a:solidFill>
+                        <a:srgbClr val="000000"/>
+                      </a:solidFill>
+                      <a:prstDash val="solid"/>
+                      <a:round/>
+                      <a:headEnd type="none" w="med" len="med"/>
+                      <a:tailEnd type="none" w="med" len="med"/>
+                    </a:lnR>
+                    <a:lnT w="12700" cap="flat" cmpd="sng" algn="ctr">
+                      <a:solidFill>
+                        <a:srgbClr val="000000"/>
+                      </a:solidFill>
+                      <a:prstDash val="solid"/>
+                      <a:round/>
+                      <a:headEnd type="none" w="med" len="med"/>
+                      <a:tailEnd type="none" w="med" len="med"/>
+                    </a:lnT>
+                    <a:lnB w="6350" cap="flat" cmpd="sng" algn="ctr">
+                      <a:solidFill>
+                        <a:srgbClr val="000000"/>
+                      </a:solidFill>
+                      <a:prstDash val="solid"/>
+                      <a:round/>
+                      <a:headEnd type="none" w="med" len="med"/>
+                      <a:tailEnd type="none" w="med" len="med"/>
+                    </a:lnB>
+                    <a:noFill/>
+                  </a:tcPr>
+                </a:tc>
+                <a:extLst>
+                  <a:ext uri="{0D108BD9-81ED-4DB2-BD59-A6C34878D82A}">
+                    <a16:rowId xmlns:a16="http://schemas.microsoft.com/office/drawing/2014/main" val="440393656"/>
+                  </a:ext>
+                </a:extLst>
+              </a:tr>
+              <a:tr h="388620">
+                <a:tc>
+                  <a:txBody>
+                    <a:bodyPr/>
+                    <a:lstStyle/>
+                    <a:p>
+                      <a:pPr algn="l" fontAlgn="b"/>
+                      <a:r>
+                        <a:rPr lang="es-CO" sz="1200" b="0" i="0" u="none" strike="noStrike">
+                          <a:solidFill>
+                            <a:srgbClr val="000000"/>
+                          </a:solidFill>
+                          <a:effectLst/>
+                          <a:latin typeface="Arial" panose="020B0604020202020204" pitchFamily="34" charset="0"/>
+                        </a:rPr>
+                        <a:t>M2-Tiempo sin seroreversion</a:t>
+                      </a:r>
+                    </a:p>
+                  </a:txBody>
+                  <a:tcPr marL="7620" marR="7620" marT="7620" marB="0" anchor="b">
+                    <a:lnL w="12700" cap="flat" cmpd="sng" algn="ctr">
                       <a:solidFill>
                         <a:srgbClr val="000000"/>
                       </a:solidFill>
@@ -4664,79 +4787,14 @@
                     <a:p>
                       <a:pPr algn="l" fontAlgn="b"/>
                       <a:r>
-                        <a:rPr lang="es-CO" sz="1100" b="0" i="0" u="none" strike="noStrike">
+                        <a:rPr lang="es-CO" sz="1200" b="0" i="0" u="none" strike="noStrike">
                           <a:solidFill>
                             <a:srgbClr val="000000"/>
                           </a:solidFill>
                           <a:effectLst/>
-                          <a:latin typeface="Calibri" panose="020F0502020204030204" pitchFamily="34" charset="0"/>
+                          <a:latin typeface="Arial" panose="020B0604020202020204" pitchFamily="34" charset="0"/>
                         </a:rPr>
-                        <a:t> </a:t>
-                      </a:r>
-                    </a:p>
-                  </a:txBody>
-                  <a:tcPr marL="7620" marR="7620" marT="7620" marB="0" anchor="b">
-                    <a:lnL w="6350" cap="flat" cmpd="sng" algn="ctr">
-                      <a:solidFill>
-                        <a:srgbClr val="000000"/>
-                      </a:solidFill>
-                      <a:prstDash val="solid"/>
-                      <a:round/>
-                      <a:headEnd type="none" w="med" len="med"/>
-                      <a:tailEnd type="none" w="med" len="med"/>
-                    </a:lnL>
-                    <a:lnR w="6350" cap="flat" cmpd="sng" algn="ctr">
-                      <a:solidFill>
-                        <a:srgbClr val="000000"/>
-                      </a:solidFill>
-                      <a:prstDash val="solid"/>
-                      <a:round/>
-                      <a:headEnd type="none" w="med" len="med"/>
-                      <a:tailEnd type="none" w="med" len="med"/>
-                    </a:lnR>
-                    <a:lnT w="6350" cap="flat" cmpd="sng" algn="ctr">
-                      <a:solidFill>
-                        <a:srgbClr val="000000"/>
-                      </a:solidFill>
-                      <a:prstDash val="solid"/>
-                      <a:round/>
-                      <a:headEnd type="none" w="med" len="med"/>
-                      <a:tailEnd type="none" w="med" len="med"/>
-                    </a:lnT>
-                    <a:lnB w="6350" cap="flat" cmpd="sng" algn="ctr">
-                      <a:solidFill>
-                        <a:srgbClr val="000000"/>
-                      </a:solidFill>
-                      <a:prstDash val="solid"/>
-                      <a:round/>
-                      <a:headEnd type="none" w="med" len="med"/>
-                      <a:tailEnd type="none" w="med" len="med"/>
-                    </a:lnB>
-                    <a:noFill/>
-                  </a:tcPr>
-                </a:tc>
-                <a:extLst>
-                  <a:ext uri="{0D108BD9-81ED-4DB2-BD59-A6C34878D82A}">
-                    <a16:rowId xmlns:a16="http://schemas.microsoft.com/office/drawing/2014/main" val="2885617201"/>
-                  </a:ext>
-                </a:extLst>
-              </a:tr>
-              <a:tr h="182880">
-                <a:tc>
-                  <a:txBody>
-                    <a:bodyPr/>
-                    <a:lstStyle/>
-                    <a:p>
-                      <a:pPr algn="l" fontAlgn="b"/>
-                      <a:r>
-                        <a:rPr lang="es-CO" sz="1100" b="0" i="0" u="none" strike="noStrike">
-                          <a:solidFill>
-                            <a:srgbClr val="000000"/>
-                          </a:solidFill>
-                          <a:effectLst/>
-                          <a:latin typeface="Calibri" panose="020F0502020204030204" pitchFamily="34" charset="0"/>
-                        </a:rPr>
-                        <a:t>Tiempo sin seroreversion</a:t>
+                        <a:t>-5.5(se=1.5)</a:t>
                       </a:r>
                     </a:p>
                   </a:txBody>
@@ -4787,14 +4845,14 @@
                     <a:p>
                       <a:pPr algn="l" fontAlgn="b"/>
                       <a:r>
-                        <a:rPr lang="es-CO" sz="1100" b="0" i="0" u="none" strike="noStrike">
+                        <a:rPr lang="es-CO" sz="1200" b="0" i="0" u="none" strike="noStrike">
                           <a:solidFill>
                             <a:srgbClr val="000000"/>
                           </a:solidFill>
                           <a:effectLst/>
-                          <a:latin typeface="Calibri" panose="020F0502020204030204" pitchFamily="34" charset="0"/>
+                          <a:latin typeface="Arial" panose="020B0604020202020204" pitchFamily="34" charset="0"/>
                         </a:rPr>
-                        <a:t>-34.4(se=4.5)</a:t>
+                        <a:t> </a:t>
                       </a:r>
                     </a:p>
                   </a:txBody>
@@ -4845,14 +4903,72 @@
                     <a:p>
                       <a:pPr algn="l" fontAlgn="b"/>
                       <a:r>
-                        <a:rPr lang="es-CO" sz="1100" b="0" i="0" u="none" strike="noStrike">
+                        <a:rPr lang="es-CO" sz="1200" b="0" i="0" u="none" strike="noStrike">
                           <a:solidFill>
                             <a:srgbClr val="000000"/>
                           </a:solidFill>
                           <a:effectLst/>
-                          <a:latin typeface="Calibri" panose="020F0502020204030204" pitchFamily="34" charset="0"/>
+                          <a:latin typeface="Arial" panose="020B0604020202020204" pitchFamily="34" charset="0"/>
                         </a:rPr>
                         <a:t> </a:t>
+                      </a:r>
+                    </a:p>
+                  </a:txBody>
+                  <a:tcPr marL="7620" marR="7620" marT="7620" marB="0" anchor="b">
+                    <a:lnL w="6350" cap="flat" cmpd="sng" algn="ctr">
+                      <a:solidFill>
+                        <a:srgbClr val="000000"/>
+                      </a:solidFill>
+                      <a:prstDash val="solid"/>
+                      <a:round/>
+                      <a:headEnd type="none" w="med" len="med"/>
+                      <a:tailEnd type="none" w="med" len="med"/>
+                    </a:lnL>
+                    <a:lnR w="6350" cap="flat" cmpd="sng" algn="ctr">
+                      <a:solidFill>
+                        <a:srgbClr val="000000"/>
+                      </a:solidFill>
+                      <a:prstDash val="solid"/>
+                      <a:round/>
+                      <a:headEnd type="none" w="med" len="med"/>
+                      <a:tailEnd type="none" w="med" len="med"/>
+                    </a:lnR>
+                    <a:lnT w="6350" cap="flat" cmpd="sng" algn="ctr">
+                      <a:solidFill>
+                        <a:srgbClr val="000000"/>
+                      </a:solidFill>
+                      <a:prstDash val="solid"/>
+                      <a:round/>
+                      <a:headEnd type="none" w="med" len="med"/>
+                      <a:tailEnd type="none" w="med" len="med"/>
+                    </a:lnT>
+                    <a:lnB w="6350" cap="flat" cmpd="sng" algn="ctr">
+                      <a:solidFill>
+                        <a:srgbClr val="000000"/>
+                      </a:solidFill>
+                      <a:prstDash val="solid"/>
+                      <a:round/>
+                      <a:headEnd type="none" w="med" len="med"/>
+                      <a:tailEnd type="none" w="med" len="med"/>
+                    </a:lnB>
+                    <a:noFill/>
+                  </a:tcPr>
+                </a:tc>
+                <a:tc>
+                  <a:txBody>
+                    <a:bodyPr/>
+                    <a:lstStyle/>
+                    <a:p>
+                      <a:pPr algn="ctr" fontAlgn="b"/>
+                      <a:r>
+                        <a:rPr lang="es-CO" sz="1200" b="0" i="0" u="none" strike="noStrike">
+                          <a:solidFill>
+                            <a:srgbClr val="000000"/>
+                          </a:solidFill>
+                          <a:effectLst/>
+                          <a:latin typeface="Arial" panose="020B0604020202020204" pitchFamily="34" charset="0"/>
+                        </a:rPr>
+                        <a:t>si</a:t>
                       </a:r>
                     </a:p>
                   </a:txBody>
@@ -4903,12 +5019,12 @@
                     <a:p>
                       <a:pPr algn="l" fontAlgn="b"/>
                       <a:r>
-                        <a:rPr lang="es-CO" sz="1100" b="0" i="0" u="none" strike="noStrike">
+                        <a:rPr lang="es-CO" sz="1200" b="0" i="0" u="none" strike="noStrike">
                           <a:solidFill>
                             <a:srgbClr val="000000"/>
                           </a:solidFill>
                           <a:effectLst/>
-                          <a:latin typeface="Calibri" panose="020F0502020204030204" pitchFamily="34" charset="0"/>
+                          <a:latin typeface="Arial" panose="020B0604020202020204" pitchFamily="34" charset="0"/>
                         </a:rPr>
                         <a:t> </a:t>
                       </a:r>
@@ -4961,19 +5077,84 @@
                     <a:p>
                       <a:pPr algn="l" fontAlgn="b"/>
                       <a:r>
-                        <a:rPr lang="es-CO" sz="1100" b="0" i="0" u="none" strike="noStrike">
+                        <a:rPr lang="es-CO" sz="1200" b="0" i="0" u="none" strike="noStrike">
                           <a:solidFill>
                             <a:srgbClr val="000000"/>
                           </a:solidFill>
                           <a:effectLst/>
-                          <a:latin typeface="Calibri" panose="020F0502020204030204" pitchFamily="34" charset="0"/>
+                          <a:latin typeface="Arial" panose="020B0604020202020204" pitchFamily="34" charset="0"/>
                         </a:rPr>
-                        <a:t>yes</a:t>
+                        <a:t> </a:t>
                       </a:r>
                     </a:p>
                   </a:txBody>
                   <a:tcPr marL="7620" marR="7620" marT="7620" marB="0" anchor="b">
                     <a:lnL w="6350" cap="flat" cmpd="sng" algn="ctr">
+                      <a:solidFill>
+                        <a:srgbClr val="000000"/>
+                      </a:solidFill>
+                      <a:prstDash val="solid"/>
+                      <a:round/>
+                      <a:headEnd type="none" w="med" len="med"/>
+                      <a:tailEnd type="none" w="med" len="med"/>
+                    </a:lnL>
+                    <a:lnR w="12700" cap="flat" cmpd="sng" algn="ctr">
+                      <a:solidFill>
+                        <a:srgbClr val="000000"/>
+                      </a:solidFill>
+                      <a:prstDash val="solid"/>
+                      <a:round/>
+                      <a:headEnd type="none" w="med" len="med"/>
+                      <a:tailEnd type="none" w="med" len="med"/>
+                    </a:lnR>
+                    <a:lnT w="6350" cap="flat" cmpd="sng" algn="ctr">
+                      <a:solidFill>
+                        <a:srgbClr val="000000"/>
+                      </a:solidFill>
+                      <a:prstDash val="solid"/>
+                      <a:round/>
+                      <a:headEnd type="none" w="med" len="med"/>
+                      <a:tailEnd type="none" w="med" len="med"/>
+                    </a:lnT>
+                    <a:lnB w="6350" cap="flat" cmpd="sng" algn="ctr">
+                      <a:solidFill>
+                        <a:srgbClr val="000000"/>
+                      </a:solidFill>
+                      <a:prstDash val="solid"/>
+                      <a:round/>
+                      <a:headEnd type="none" w="med" len="med"/>
+                      <a:tailEnd type="none" w="med" len="med"/>
+                    </a:lnB>
+                    <a:noFill/>
+                  </a:tcPr>
+                </a:tc>
+                <a:extLst>
+                  <a:ext uri="{0D108BD9-81ED-4DB2-BD59-A6C34878D82A}">
+                    <a16:rowId xmlns:a16="http://schemas.microsoft.com/office/drawing/2014/main" val="1361662365"/>
+                  </a:ext>
+                </a:extLst>
+              </a:tr>
+              <a:tr h="388620">
+                <a:tc>
+                  <a:txBody>
+                    <a:bodyPr/>
+                    <a:lstStyle/>
+                    <a:p>
+                      <a:pPr algn="l" fontAlgn="b"/>
+                      <a:r>
+                        <a:rPr lang="es-CO" sz="1200" b="0" i="0" u="none" strike="noStrike">
+                          <a:solidFill>
+                            <a:srgbClr val="000000"/>
+                          </a:solidFill>
+                          <a:effectLst/>
+                          <a:latin typeface="Arial" panose="020B0604020202020204" pitchFamily="34" charset="0"/>
+                        </a:rPr>
+                        <a:t>M3-Edad sin serorevesion</a:t>
+                      </a:r>
+                    </a:p>
+                  </a:txBody>
+                  <a:tcPr marL="7620" marR="7620" marT="7620" marB="0" anchor="b">
+                    <a:lnL w="12700" cap="flat" cmpd="sng" algn="ctr">
                       <a:solidFill>
                         <a:srgbClr val="000000"/>
                       </a:solidFill>
@@ -5019,14 +5200,14 @@
                     <a:p>
                       <a:pPr algn="l" fontAlgn="b"/>
                       <a:r>
-                        <a:rPr lang="es-CO" sz="1100" b="0" i="0" u="none" strike="noStrike">
+                        <a:rPr lang="es-CO" sz="1200" b="0" i="0" u="none" strike="noStrike">
                           <a:solidFill>
                             <a:srgbClr val="000000"/>
                           </a:solidFill>
                           <a:effectLst/>
-                          <a:latin typeface="Calibri" panose="020F0502020204030204" pitchFamily="34" charset="0"/>
+                          <a:latin typeface="Arial" panose="020B0604020202020204" pitchFamily="34" charset="0"/>
                         </a:rPr>
-                        <a:t> </a:t>
+                        <a:t>-16.5(se=10.8)</a:t>
                       </a:r>
                     </a:p>
                   </a:txBody>
@@ -5077,79 +5258,14 @@
                     <a:p>
                       <a:pPr algn="l" fontAlgn="b"/>
                       <a:r>
-                        <a:rPr lang="es-CO" sz="1100" b="0" i="0" u="none" strike="noStrike">
+                        <a:rPr lang="es-CO" sz="1200" b="0" i="0" u="none" strike="noStrike">
                           <a:solidFill>
                             <a:srgbClr val="000000"/>
                           </a:solidFill>
                           <a:effectLst/>
-                          <a:latin typeface="Calibri" panose="020F0502020204030204" pitchFamily="34" charset="0"/>
+                          <a:latin typeface="Arial" panose="020B0604020202020204" pitchFamily="34" charset="0"/>
                         </a:rPr>
                         <a:t> </a:t>
-                      </a:r>
-                    </a:p>
-                  </a:txBody>
-                  <a:tcPr marL="7620" marR="7620" marT="7620" marB="0" anchor="b">
-                    <a:lnL w="6350" cap="flat" cmpd="sng" algn="ctr">
-                      <a:solidFill>
-                        <a:srgbClr val="000000"/>
-                      </a:solidFill>
-                      <a:prstDash val="solid"/>
-                      <a:round/>
-                      <a:headEnd type="none" w="med" len="med"/>
-                      <a:tailEnd type="none" w="med" len="med"/>
-                    </a:lnL>
-                    <a:lnR w="6350" cap="flat" cmpd="sng" algn="ctr">
-                      <a:solidFill>
-                        <a:srgbClr val="000000"/>
-                      </a:solidFill>
-                      <a:prstDash val="solid"/>
-                      <a:round/>
-                      <a:headEnd type="none" w="med" len="med"/>
-                      <a:tailEnd type="none" w="med" len="med"/>
-                    </a:lnR>
-                    <a:lnT w="6350" cap="flat" cmpd="sng" algn="ctr">
-                      <a:solidFill>
-                        <a:srgbClr val="000000"/>
-                      </a:solidFill>
-                      <a:prstDash val="solid"/>
-                      <a:round/>
-                      <a:headEnd type="none" w="med" len="med"/>
-                      <a:tailEnd type="none" w="med" len="med"/>
-                    </a:lnT>
-                    <a:lnB w="6350" cap="flat" cmpd="sng" algn="ctr">
-                      <a:solidFill>
-                        <a:srgbClr val="000000"/>
-                      </a:solidFill>
-                      <a:prstDash val="solid"/>
-                      <a:round/>
-                      <a:headEnd type="none" w="med" len="med"/>
-                      <a:tailEnd type="none" w="med" len="med"/>
-                    </a:lnB>
-                    <a:noFill/>
-                  </a:tcPr>
-                </a:tc>
-                <a:extLst>
-                  <a:ext uri="{0D108BD9-81ED-4DB2-BD59-A6C34878D82A}">
-                    <a16:rowId xmlns:a16="http://schemas.microsoft.com/office/drawing/2014/main" val="3594625483"/>
-                  </a:ext>
-                </a:extLst>
-              </a:tr>
-              <a:tr h="182880">
-                <a:tc>
-                  <a:txBody>
-                    <a:bodyPr/>
-                    <a:lstStyle/>
-                    <a:p>
-                      <a:pPr algn="l" fontAlgn="b"/>
-                      <a:r>
-                        <a:rPr lang="es-CO" sz="1100" b="0" i="0" u="none" strike="noStrike">
-                          <a:solidFill>
-                            <a:srgbClr val="000000"/>
-                          </a:solidFill>
-                          <a:effectLst/>
-                          <a:latin typeface="Calibri" panose="020F0502020204030204" pitchFamily="34" charset="0"/>
-                        </a:rPr>
-                        <a:t>Edad sin serorevesion</a:t>
                       </a:r>
                     </a:p>
                   </a:txBody>
@@ -5200,14 +5316,72 @@
                     <a:p>
                       <a:pPr algn="l" fontAlgn="b"/>
                       <a:r>
-                        <a:rPr lang="es-CO" sz="1100" b="0" i="0" u="none" strike="noStrike">
+                        <a:rPr lang="es-CO" sz="1200" b="0" i="0" u="none" strike="noStrike">
                           <a:solidFill>
                             <a:srgbClr val="000000"/>
                           </a:solidFill>
                           <a:effectLst/>
-                          <a:latin typeface="Calibri" panose="020F0502020204030204" pitchFamily="34" charset="0"/>
+                          <a:latin typeface="Arial" panose="020B0604020202020204" pitchFamily="34" charset="0"/>
                         </a:rPr>
-                        <a:t>-58.1(se=17.5)</a:t>
+                        <a:t> </a:t>
+                      </a:r>
+                    </a:p>
+                  </a:txBody>
+                  <a:tcPr marL="7620" marR="7620" marT="7620" marB="0" anchor="b">
+                    <a:lnL w="6350" cap="flat" cmpd="sng" algn="ctr">
+                      <a:solidFill>
+                        <a:srgbClr val="000000"/>
+                      </a:solidFill>
+                      <a:prstDash val="solid"/>
+                      <a:round/>
+                      <a:headEnd type="none" w="med" len="med"/>
+                      <a:tailEnd type="none" w="med" len="med"/>
+                    </a:lnL>
+                    <a:lnR w="6350" cap="flat" cmpd="sng" algn="ctr">
+                      <a:solidFill>
+                        <a:srgbClr val="000000"/>
+                      </a:solidFill>
+                      <a:prstDash val="solid"/>
+                      <a:round/>
+                      <a:headEnd type="none" w="med" len="med"/>
+                      <a:tailEnd type="none" w="med" len="med"/>
+                    </a:lnR>
+                    <a:lnT w="6350" cap="flat" cmpd="sng" algn="ctr">
+                      <a:solidFill>
+                        <a:srgbClr val="000000"/>
+                      </a:solidFill>
+                      <a:prstDash val="solid"/>
+                      <a:round/>
+                      <a:headEnd type="none" w="med" len="med"/>
+                      <a:tailEnd type="none" w="med" len="med"/>
+                    </a:lnT>
+                    <a:lnB w="6350" cap="flat" cmpd="sng" algn="ctr">
+                      <a:solidFill>
+                        <a:srgbClr val="000000"/>
+                      </a:solidFill>
+                      <a:prstDash val="solid"/>
+                      <a:round/>
+                      <a:headEnd type="none" w="med" len="med"/>
+                      <a:tailEnd type="none" w="med" len="med"/>
+                    </a:lnB>
+                    <a:noFill/>
+                  </a:tcPr>
+                </a:tc>
+                <a:tc>
+                  <a:txBody>
+                    <a:bodyPr/>
+                    <a:lstStyle/>
+                    <a:p>
+                      <a:pPr algn="ctr" fontAlgn="b"/>
+                      <a:r>
+                        <a:rPr lang="es-CO" sz="1200" b="0" i="0" u="none" strike="noStrike">
+                          <a:solidFill>
+                            <a:srgbClr val="000000"/>
+                          </a:solidFill>
+                          <a:effectLst/>
+                          <a:latin typeface="Arial" panose="020B0604020202020204" pitchFamily="34" charset="0"/>
+                        </a:rPr>
+                        <a:t>si</a:t>
                       </a:r>
                     </a:p>
                   </a:txBody>
@@ -5258,12 +5432,12 @@
                     <a:p>
                       <a:pPr algn="l" fontAlgn="b"/>
                       <a:r>
-                        <a:rPr lang="es-CO" sz="1100" b="0" i="0" u="none" strike="noStrike">
+                        <a:rPr lang="es-CO" sz="1200" b="0" i="0" u="none" strike="noStrike">
                           <a:solidFill>
                             <a:srgbClr val="000000"/>
                           </a:solidFill>
                           <a:effectLst/>
-                          <a:latin typeface="Calibri" panose="020F0502020204030204" pitchFamily="34" charset="0"/>
+                          <a:latin typeface="Arial" panose="020B0604020202020204" pitchFamily="34" charset="0"/>
                         </a:rPr>
                         <a:t> </a:t>
                       </a:r>
@@ -5316,12 +5490,12 @@
                     <a:p>
                       <a:pPr algn="l" fontAlgn="b"/>
                       <a:r>
-                        <a:rPr lang="es-CO" sz="1100" b="0" i="0" u="none" strike="noStrike">
+                        <a:rPr lang="es-CO" sz="1200" b="0" i="0" u="none" strike="noStrike">
                           <a:solidFill>
                             <a:srgbClr val="000000"/>
                           </a:solidFill>
                           <a:effectLst/>
-                          <a:latin typeface="Calibri" panose="020F0502020204030204" pitchFamily="34" charset="0"/>
+                          <a:latin typeface="Arial" panose="020B0604020202020204" pitchFamily="34" charset="0"/>
                         </a:rPr>
                         <a:t> </a:t>
                       </a:r>
@@ -5337,7 +5511,7 @@
                       <a:headEnd type="none" w="med" len="med"/>
                       <a:tailEnd type="none" w="med" len="med"/>
                     </a:lnL>
-                    <a:lnR w="6350" cap="flat" cmpd="sng" algn="ctr">
+                    <a:lnR w="12700" cap="flat" cmpd="sng" algn="ctr">
                       <a:solidFill>
                         <a:srgbClr val="000000"/>
                       </a:solidFill>
@@ -5356,6 +5530,71 @@
                       <a:tailEnd type="none" w="med" len="med"/>
                     </a:lnT>
                     <a:lnB w="6350" cap="flat" cmpd="sng" algn="ctr">
+                      <a:solidFill>
+                        <a:srgbClr val="000000"/>
+                      </a:solidFill>
+                      <a:prstDash val="solid"/>
+                      <a:round/>
+                      <a:headEnd type="none" w="med" len="med"/>
+                      <a:tailEnd type="none" w="med" len="med"/>
+                    </a:lnB>
+                    <a:noFill/>
+                  </a:tcPr>
+                </a:tc>
+                <a:extLst>
+                  <a:ext uri="{0D108BD9-81ED-4DB2-BD59-A6C34878D82A}">
+                    <a16:rowId xmlns:a16="http://schemas.microsoft.com/office/drawing/2014/main" val="293282779"/>
+                  </a:ext>
+                </a:extLst>
+              </a:tr>
+              <a:tr h="396240">
+                <a:tc>
+                  <a:txBody>
+                    <a:bodyPr/>
+                    <a:lstStyle/>
+                    <a:p>
+                      <a:pPr algn="l" fontAlgn="b"/>
+                      <a:r>
+                        <a:rPr lang="es-CO" sz="1200" b="0" i="0" u="none" strike="noStrike">
+                          <a:solidFill>
+                            <a:srgbClr val="000000"/>
+                          </a:solidFill>
+                          <a:effectLst/>
+                          <a:latin typeface="Arial" panose="020B0604020202020204" pitchFamily="34" charset="0"/>
+                        </a:rPr>
+                        <a:t>M4-Edad con seroreversion</a:t>
+                      </a:r>
+                    </a:p>
+                  </a:txBody>
+                  <a:tcPr marL="7620" marR="7620" marT="7620" marB="0" anchor="b">
+                    <a:lnL w="12700" cap="flat" cmpd="sng" algn="ctr">
+                      <a:solidFill>
+                        <a:srgbClr val="000000"/>
+                      </a:solidFill>
+                      <a:prstDash val="solid"/>
+                      <a:round/>
+                      <a:headEnd type="none" w="med" len="med"/>
+                      <a:tailEnd type="none" w="med" len="med"/>
+                    </a:lnL>
+                    <a:lnR w="6350" cap="flat" cmpd="sng" algn="ctr">
+                      <a:solidFill>
+                        <a:srgbClr val="000000"/>
+                      </a:solidFill>
+                      <a:prstDash val="solid"/>
+                      <a:round/>
+                      <a:headEnd type="none" w="med" len="med"/>
+                      <a:tailEnd type="none" w="med" len="med"/>
+                    </a:lnR>
+                    <a:lnT w="6350" cap="flat" cmpd="sng" algn="ctr">
+                      <a:solidFill>
+                        <a:srgbClr val="000000"/>
+                      </a:solidFill>
+                      <a:prstDash val="solid"/>
+                      <a:round/>
+                      <a:headEnd type="none" w="med" len="med"/>
+                      <a:tailEnd type="none" w="med" len="med"/>
+                    </a:lnT>
+                    <a:lnB w="12700" cap="flat" cmpd="sng" algn="ctr">
                       <a:solidFill>
                         <a:srgbClr val="000000"/>
                       </a:solidFill>
@@ -5374,14 +5613,14 @@
                     <a:p>
                       <a:pPr algn="l" fontAlgn="b"/>
                       <a:r>
-                        <a:rPr lang="es-CO" sz="1100" b="0" i="0" u="none" strike="noStrike">
+                        <a:rPr lang="es-CO" sz="1200" b="0" i="0" u="none" strike="noStrike">
                           <a:solidFill>
                             <a:srgbClr val="000000"/>
                           </a:solidFill>
                           <a:effectLst/>
-                          <a:latin typeface="Calibri" panose="020F0502020204030204" pitchFamily="34" charset="0"/>
+                          <a:latin typeface="Arial" panose="020B0604020202020204" pitchFamily="34" charset="0"/>
                         </a:rPr>
-                        <a:t>yes</a:t>
+                        <a:t>-19.8(se=14.2)</a:t>
                       </a:r>
                     </a:p>
                   </a:txBody>
@@ -5413,7 +5652,7 @@
                       <a:headEnd type="none" w="med" len="med"/>
                       <a:tailEnd type="none" w="med" len="med"/>
                     </a:lnT>
-                    <a:lnB w="6350" cap="flat" cmpd="sng" algn="ctr">
+                    <a:lnB w="12700" cap="flat" cmpd="sng" algn="ctr">
                       <a:solidFill>
                         <a:srgbClr val="000000"/>
                       </a:solidFill>
@@ -5432,12 +5671,12 @@
                     <a:p>
                       <a:pPr algn="l" fontAlgn="b"/>
                       <a:r>
-                        <a:rPr lang="es-CO" sz="1100" b="0" i="0" u="none" strike="noStrike">
+                        <a:rPr lang="es-CO" sz="1200" b="0" i="0" u="none" strike="noStrike">
                           <a:solidFill>
                             <a:srgbClr val="000000"/>
                           </a:solidFill>
                           <a:effectLst/>
-                          <a:latin typeface="Calibri" panose="020F0502020204030204" pitchFamily="34" charset="0"/>
+                          <a:latin typeface="Arial" panose="020B0604020202020204" pitchFamily="34" charset="0"/>
                         </a:rPr>
                         <a:t> </a:t>
                       </a:r>
@@ -5471,7 +5710,7 @@
                       <a:headEnd type="none" w="med" len="med"/>
                       <a:tailEnd type="none" w="med" len="med"/>
                     </a:lnT>
-                    <a:lnB w="6350" cap="flat" cmpd="sng" algn="ctr">
+                    <a:lnB w="12700" cap="flat" cmpd="sng" algn="ctr">
                       <a:solidFill>
                         <a:srgbClr val="000000"/>
                       </a:solidFill>
@@ -5490,12 +5729,12 @@
                     <a:p>
                       <a:pPr algn="l" fontAlgn="b"/>
                       <a:r>
-                        <a:rPr lang="es-CO" sz="1100" b="0" i="0" u="none" strike="noStrike">
+                        <a:rPr lang="es-CO" sz="1200" b="0" i="0" u="none" strike="noStrike">
                           <a:solidFill>
                             <a:srgbClr val="000000"/>
                           </a:solidFill>
                           <a:effectLst/>
-                          <a:latin typeface="Calibri" panose="020F0502020204030204" pitchFamily="34" charset="0"/>
+                          <a:latin typeface="Arial" panose="020B0604020202020204" pitchFamily="34" charset="0"/>
                         </a:rPr>
                         <a:t> </a:t>
                       </a:r>
@@ -5529,7 +5768,7 @@
                       <a:headEnd type="none" w="med" len="med"/>
                       <a:tailEnd type="none" w="med" len="med"/>
                     </a:lnT>
-                    <a:lnB w="6350" cap="flat" cmpd="sng" algn="ctr">
+                    <a:lnB w="12700" cap="flat" cmpd="sng" algn="ctr">
                       <a:solidFill>
                         <a:srgbClr val="000000"/>
                       </a:solidFill>
@@ -5541,28 +5780,21 @@
                     <a:noFill/>
                   </a:tcPr>
                 </a:tc>
-                <a:extLst>
-                  <a:ext uri="{0D108BD9-81ED-4DB2-BD59-A6C34878D82A}">
-                    <a16:rowId xmlns:a16="http://schemas.microsoft.com/office/drawing/2014/main" val="936717339"/>
-                  </a:ext>
-                </a:extLst>
-              </a:tr>
-              <a:tr h="182880">
                 <a:tc>
                   <a:txBody>
                     <a:bodyPr/>
                     <a:lstStyle/>
                     <a:p>
-                      <a:pPr algn="l" fontAlgn="b"/>
+                      <a:pPr algn="ctr" fontAlgn="b"/>
                       <a:r>
-                        <a:rPr lang="es-CO" sz="1100" b="0" i="0" u="none" strike="noStrike">
+                        <a:rPr lang="es-CO" sz="1200" b="0" i="0" u="none" strike="noStrike">
                           <a:solidFill>
                             <a:srgbClr val="000000"/>
                           </a:solidFill>
                           <a:effectLst/>
-                          <a:latin typeface="Calibri" panose="020F0502020204030204" pitchFamily="34" charset="0"/>
+                          <a:latin typeface="Arial" panose="020B0604020202020204" pitchFamily="34" charset="0"/>
                         </a:rPr>
-                        <a:t>Edad con seroreversion</a:t>
+                        <a:t>si</a:t>
                       </a:r>
                     </a:p>
                   </a:txBody>
@@ -5594,7 +5826,7 @@
                       <a:headEnd type="none" w="med" len="med"/>
                       <a:tailEnd type="none" w="med" len="med"/>
                     </a:lnT>
-                    <a:lnB w="6350" cap="flat" cmpd="sng" algn="ctr">
+                    <a:lnB w="12700" cap="flat" cmpd="sng" algn="ctr">
                       <a:solidFill>
                         <a:srgbClr val="000000"/>
                       </a:solidFill>
@@ -5613,14 +5845,14 @@
                     <a:p>
                       <a:pPr algn="l" fontAlgn="b"/>
                       <a:r>
-                        <a:rPr lang="es-CO" sz="1100" b="0" i="0" u="none" strike="noStrike">
+                        <a:rPr lang="es-CO" sz="1200" b="0" i="0" u="none" strike="noStrike">
                           <a:solidFill>
                             <a:srgbClr val="000000"/>
                           </a:solidFill>
                           <a:effectLst/>
-                          <a:latin typeface="Calibri" panose="020F0502020204030204" pitchFamily="34" charset="0"/>
+                          <a:latin typeface="Arial" panose="020B0604020202020204" pitchFamily="34" charset="0"/>
                         </a:rPr>
-                        <a:t>-21.8(se=0.8)</a:t>
+                        <a:t>0.015(95% CI, 0.0011-0.067)</a:t>
                       </a:r>
                     </a:p>
                   </a:txBody>
@@ -5652,7 +5884,7 @@
                       <a:headEnd type="none" w="med" len="med"/>
                       <a:tailEnd type="none" w="med" len="med"/>
                     </a:lnT>
-                    <a:lnB w="6350" cap="flat" cmpd="sng" algn="ctr">
+                    <a:lnB w="12700" cap="flat" cmpd="sng" algn="ctr">
                       <a:solidFill>
                         <a:srgbClr val="000000"/>
                       </a:solidFill>
@@ -5669,246 +5901,14 @@
                     <a:bodyPr/>
                     <a:lstStyle/>
                     <a:p>
-                      <a:pPr algn="l" fontAlgn="b"/>
+                      <a:pPr algn="ctr" fontAlgn="b"/>
                       <a:r>
-                        <a:rPr lang="es-CO" sz="1100" b="0" i="0" u="none" strike="noStrike">
+                        <a:rPr lang="es-CO" sz="1200" b="0" i="0" u="none" strike="noStrike" dirty="0">
                           <a:solidFill>
                             <a:srgbClr val="000000"/>
                           </a:solidFill>
                           <a:effectLst/>
-                          <a:latin typeface="Calibri" panose="020F0502020204030204" pitchFamily="34" charset="0"/>
-                        </a:rPr>
-                        <a:t> </a:t>
-                      </a:r>
-                    </a:p>
-                  </a:txBody>
-                  <a:tcPr marL="7620" marR="7620" marT="7620" marB="0" anchor="b">
-                    <a:lnL w="6350" cap="flat" cmpd="sng" algn="ctr">
-                      <a:solidFill>
-                        <a:srgbClr val="000000"/>
-                      </a:solidFill>
-                      <a:prstDash val="solid"/>
-                      <a:round/>
-                      <a:headEnd type="none" w="med" len="med"/>
-                      <a:tailEnd type="none" w="med" len="med"/>
-                    </a:lnL>
-                    <a:lnR w="6350" cap="flat" cmpd="sng" algn="ctr">
-                      <a:solidFill>
-                        <a:srgbClr val="000000"/>
-                      </a:solidFill>
-                      <a:prstDash val="solid"/>
-                      <a:round/>
-                      <a:headEnd type="none" w="med" len="med"/>
-                      <a:tailEnd type="none" w="med" len="med"/>
-                    </a:lnR>
-                    <a:lnT w="6350" cap="flat" cmpd="sng" algn="ctr">
-                      <a:solidFill>
-                        <a:srgbClr val="000000"/>
-                      </a:solidFill>
-                      <a:prstDash val="solid"/>
-                      <a:round/>
-                      <a:headEnd type="none" w="med" len="med"/>
-                      <a:tailEnd type="none" w="med" len="med"/>
-                    </a:lnT>
-                    <a:lnB w="6350" cap="flat" cmpd="sng" algn="ctr">
-                      <a:solidFill>
-                        <a:srgbClr val="000000"/>
-                      </a:solidFill>
-                      <a:prstDash val="solid"/>
-                      <a:round/>
-                      <a:headEnd type="none" w="med" len="med"/>
-                      <a:tailEnd type="none" w="med" len="med"/>
-                    </a:lnB>
-                    <a:noFill/>
-                  </a:tcPr>
-                </a:tc>
-                <a:tc>
-                  <a:txBody>
-                    <a:bodyPr/>
-                    <a:lstStyle/>
-                    <a:p>
-                      <a:pPr algn="l" fontAlgn="b"/>
-                      <a:r>
-                        <a:rPr lang="es-CO" sz="1100" b="0" i="0" u="none" strike="noStrike">
-                          <a:solidFill>
-                            <a:srgbClr val="000000"/>
-                          </a:solidFill>
-                          <a:effectLst/>
-                          <a:latin typeface="Calibri" panose="020F0502020204030204" pitchFamily="34" charset="0"/>
-                        </a:rPr>
-                        <a:t> </a:t>
-                      </a:r>
-                    </a:p>
-                  </a:txBody>
-                  <a:tcPr marL="7620" marR="7620" marT="7620" marB="0" anchor="b">
-                    <a:lnL w="6350" cap="flat" cmpd="sng" algn="ctr">
-                      <a:solidFill>
-                        <a:srgbClr val="000000"/>
-                      </a:solidFill>
-                      <a:prstDash val="solid"/>
-                      <a:round/>
-                      <a:headEnd type="none" w="med" len="med"/>
-                      <a:tailEnd type="none" w="med" len="med"/>
-                    </a:lnL>
-                    <a:lnR w="6350" cap="flat" cmpd="sng" algn="ctr">
-                      <a:solidFill>
-                        <a:srgbClr val="000000"/>
-                      </a:solidFill>
-                      <a:prstDash val="solid"/>
-                      <a:round/>
-                      <a:headEnd type="none" w="med" len="med"/>
-                      <a:tailEnd type="none" w="med" len="med"/>
-                    </a:lnR>
-                    <a:lnT w="6350" cap="flat" cmpd="sng" algn="ctr">
-                      <a:solidFill>
-                        <a:srgbClr val="000000"/>
-                      </a:solidFill>
-                      <a:prstDash val="solid"/>
-                      <a:round/>
-                      <a:headEnd type="none" w="med" len="med"/>
-                      <a:tailEnd type="none" w="med" len="med"/>
-                    </a:lnT>
-                    <a:lnB w="6350" cap="flat" cmpd="sng" algn="ctr">
-                      <a:solidFill>
-                        <a:srgbClr val="000000"/>
-                      </a:solidFill>
-                      <a:prstDash val="solid"/>
-                      <a:round/>
-                      <a:headEnd type="none" w="med" len="med"/>
-                      <a:tailEnd type="none" w="med" len="med"/>
-                    </a:lnB>
-                    <a:noFill/>
-                  </a:tcPr>
-                </a:tc>
-                <a:tc>
-                  <a:txBody>
-                    <a:bodyPr/>
-                    <a:lstStyle/>
-                    <a:p>
-                      <a:pPr algn="l" fontAlgn="b"/>
-                      <a:r>
-                        <a:rPr lang="es-CO" sz="1100" b="0" i="0" u="none" strike="noStrike">
-                          <a:solidFill>
-                            <a:srgbClr val="000000"/>
-                          </a:solidFill>
-                          <a:effectLst/>
-                          <a:latin typeface="Calibri" panose="020F0502020204030204" pitchFamily="34" charset="0"/>
-                        </a:rPr>
-                        <a:t>yes</a:t>
-                      </a:r>
-                    </a:p>
-                  </a:txBody>
-                  <a:tcPr marL="7620" marR="7620" marT="7620" marB="0" anchor="b">
-                    <a:lnL w="6350" cap="flat" cmpd="sng" algn="ctr">
-                      <a:solidFill>
-                        <a:srgbClr val="000000"/>
-                      </a:solidFill>
-                      <a:prstDash val="solid"/>
-                      <a:round/>
-                      <a:headEnd type="none" w="med" len="med"/>
-                      <a:tailEnd type="none" w="med" len="med"/>
-                    </a:lnL>
-                    <a:lnR w="6350" cap="flat" cmpd="sng" algn="ctr">
-                      <a:solidFill>
-                        <a:srgbClr val="000000"/>
-                      </a:solidFill>
-                      <a:prstDash val="solid"/>
-                      <a:round/>
-                      <a:headEnd type="none" w="med" len="med"/>
-                      <a:tailEnd type="none" w="med" len="med"/>
-                    </a:lnR>
-                    <a:lnT w="6350" cap="flat" cmpd="sng" algn="ctr">
-                      <a:solidFill>
-                        <a:srgbClr val="000000"/>
-                      </a:solidFill>
-                      <a:prstDash val="solid"/>
-                      <a:round/>
-                      <a:headEnd type="none" w="med" len="med"/>
-                      <a:tailEnd type="none" w="med" len="med"/>
-                    </a:lnT>
-                    <a:lnB w="6350" cap="flat" cmpd="sng" algn="ctr">
-                      <a:solidFill>
-                        <a:srgbClr val="000000"/>
-                      </a:solidFill>
-                      <a:prstDash val="solid"/>
-                      <a:round/>
-                      <a:headEnd type="none" w="med" len="med"/>
-                      <a:tailEnd type="none" w="med" len="med"/>
-                    </a:lnB>
-                    <a:noFill/>
-                  </a:tcPr>
-                </a:tc>
-                <a:tc>
-                  <a:txBody>
-                    <a:bodyPr/>
-                    <a:lstStyle/>
-                    <a:p>
-                      <a:pPr algn="l" fontAlgn="b"/>
-                      <a:r>
-                        <a:rPr lang="es-CO" sz="1100" b="0" i="0" u="none" strike="noStrike">
-                          <a:solidFill>
-                            <a:srgbClr val="000000"/>
-                          </a:solidFill>
-                          <a:effectLst/>
-                          <a:latin typeface="Calibri" panose="020F0502020204030204" pitchFamily="34" charset="0"/>
-                        </a:rPr>
-                        <a:t>1.3(95% CI, 0.7-2)</a:t>
-                      </a:r>
-                    </a:p>
-                  </a:txBody>
-                  <a:tcPr marL="7620" marR="7620" marT="7620" marB="0" anchor="b">
-                    <a:lnL w="6350" cap="flat" cmpd="sng" algn="ctr">
-                      <a:solidFill>
-                        <a:srgbClr val="000000"/>
-                      </a:solidFill>
-                      <a:prstDash val="solid"/>
-                      <a:round/>
-                      <a:headEnd type="none" w="med" len="med"/>
-                      <a:tailEnd type="none" w="med" len="med"/>
-                    </a:lnL>
-                    <a:lnR w="6350" cap="flat" cmpd="sng" algn="ctr">
-                      <a:solidFill>
-                        <a:srgbClr val="000000"/>
-                      </a:solidFill>
-                      <a:prstDash val="solid"/>
-                      <a:round/>
-                      <a:headEnd type="none" w="med" len="med"/>
-                      <a:tailEnd type="none" w="med" len="med"/>
-                    </a:lnR>
-                    <a:lnT w="6350" cap="flat" cmpd="sng" algn="ctr">
-                      <a:solidFill>
-                        <a:srgbClr val="000000"/>
-                      </a:solidFill>
-                      <a:prstDash val="solid"/>
-                      <a:round/>
-                      <a:headEnd type="none" w="med" len="med"/>
-                      <a:tailEnd type="none" w="med" len="med"/>
-                    </a:lnT>
-                    <a:lnB w="6350" cap="flat" cmpd="sng" algn="ctr">
-                      <a:solidFill>
-                        <a:srgbClr val="000000"/>
-                      </a:solidFill>
-                      <a:prstDash val="solid"/>
-                      <a:round/>
-                      <a:headEnd type="none" w="med" len="med"/>
-                      <a:tailEnd type="none" w="med" len="med"/>
-                    </a:lnB>
-                    <a:noFill/>
-                  </a:tcPr>
-                </a:tc>
-                <a:tc>
-                  <a:txBody>
-                    <a:bodyPr/>
-                    <a:lstStyle/>
-                    <a:p>
-                      <a:pPr algn="r" fontAlgn="b"/>
-                      <a:r>
-                        <a:rPr lang="es-CO" sz="1100" b="0" i="0" u="none" strike="noStrike" dirty="0">
-                          <a:solidFill>
-                            <a:srgbClr val="000000"/>
-                          </a:solidFill>
-                          <a:effectLst/>
-                          <a:latin typeface="Calibri" panose="020F0502020204030204" pitchFamily="34" charset="0"/>
+                          <a:latin typeface="Arial" panose="020B0604020202020204" pitchFamily="34" charset="0"/>
                         </a:rPr>
                         <a:t>1</a:t>
                       </a:r>
@@ -5924,7 +5924,7 @@
                       <a:headEnd type="none" w="med" len="med"/>
                       <a:tailEnd type="none" w="med" len="med"/>
                     </a:lnL>
-                    <a:lnR w="6350" cap="flat" cmpd="sng" algn="ctr">
+                    <a:lnR w="12700" cap="flat" cmpd="sng" algn="ctr">
                       <a:solidFill>
                         <a:srgbClr val="000000"/>
                       </a:solidFill>
@@ -5942,7 +5942,7 @@
                       <a:headEnd type="none" w="med" len="med"/>
                       <a:tailEnd type="none" w="med" len="med"/>
                     </a:lnT>
-                    <a:lnB w="6350" cap="flat" cmpd="sng" algn="ctr">
+                    <a:lnB w="12700" cap="flat" cmpd="sng" algn="ctr">
                       <a:solidFill>
                         <a:srgbClr val="000000"/>
                       </a:solidFill>
@@ -5956,7 +5956,7 @@
                 </a:tc>
                 <a:extLst>
                   <a:ext uri="{0D108BD9-81ED-4DB2-BD59-A6C34878D82A}">
-                    <a16:rowId xmlns:a16="http://schemas.microsoft.com/office/drawing/2014/main" val="1862063652"/>
+                    <a16:rowId xmlns:a16="http://schemas.microsoft.com/office/drawing/2014/main" val="697097820"/>
                   </a:ext>
                 </a:extLst>
               </a:tr>

</xml_diff>